<commit_message>
Update user stories and sequence diagrams
</commit_message>
<xml_diff>
--- a/docs/diagrams/QuizAnswerCommandComponentSequenceDiagram.pptx
+++ b/docs/diagrams/QuizAnswerCommandComponentSequenceDiagram.pptx
@@ -208,7 +208,7 @@
           <a:p>
             <a:fld id="{F5CC4B3F-88C1-4FFA-B1B6-F41C21DC6924}" type="datetimeFigureOut">
               <a:rPr lang="en-US" smtClean="0"/>
-              <a:t>4/14/2019</a:t>
+              <a:t>4/15/2019</a:t>
             </a:fld>
             <a:endParaRPr lang="en-US"/>
           </a:p>
@@ -738,7 +738,7 @@
           <a:p>
             <a:fld id="{78C97017-6FC3-485B-9764-EAC9E56C1D49}" type="datetimeFigureOut">
               <a:rPr lang="en-US" smtClean="0"/>
-              <a:t>4/14/2019</a:t>
+              <a:t>4/15/2019</a:t>
             </a:fld>
             <a:endParaRPr lang="en-US"/>
           </a:p>
@@ -906,7 +906,7 @@
           <a:p>
             <a:fld id="{78C97017-6FC3-485B-9764-EAC9E56C1D49}" type="datetimeFigureOut">
               <a:rPr lang="en-US" smtClean="0"/>
-              <a:t>4/14/2019</a:t>
+              <a:t>4/15/2019</a:t>
             </a:fld>
             <a:endParaRPr lang="en-US"/>
           </a:p>
@@ -1084,7 +1084,7 @@
           <a:p>
             <a:fld id="{78C97017-6FC3-485B-9764-EAC9E56C1D49}" type="datetimeFigureOut">
               <a:rPr lang="en-US" smtClean="0"/>
-              <a:t>4/14/2019</a:t>
+              <a:t>4/15/2019</a:t>
             </a:fld>
             <a:endParaRPr lang="en-US"/>
           </a:p>
@@ -1252,7 +1252,7 @@
           <a:p>
             <a:fld id="{78C97017-6FC3-485B-9764-EAC9E56C1D49}" type="datetimeFigureOut">
               <a:rPr lang="en-US" smtClean="0"/>
-              <a:t>4/14/2019</a:t>
+              <a:t>4/15/2019</a:t>
             </a:fld>
             <a:endParaRPr lang="en-US"/>
           </a:p>
@@ -1497,7 +1497,7 @@
           <a:p>
             <a:fld id="{78C97017-6FC3-485B-9764-EAC9E56C1D49}" type="datetimeFigureOut">
               <a:rPr lang="en-US" smtClean="0"/>
-              <a:t>4/14/2019</a:t>
+              <a:t>4/15/2019</a:t>
             </a:fld>
             <a:endParaRPr lang="en-US"/>
           </a:p>
@@ -1782,7 +1782,7 @@
           <a:p>
             <a:fld id="{78C97017-6FC3-485B-9764-EAC9E56C1D49}" type="datetimeFigureOut">
               <a:rPr lang="en-US" smtClean="0"/>
-              <a:t>4/14/2019</a:t>
+              <a:t>4/15/2019</a:t>
             </a:fld>
             <a:endParaRPr lang="en-US"/>
           </a:p>
@@ -2201,7 +2201,7 @@
           <a:p>
             <a:fld id="{78C97017-6FC3-485B-9764-EAC9E56C1D49}" type="datetimeFigureOut">
               <a:rPr lang="en-US" smtClean="0"/>
-              <a:t>4/14/2019</a:t>
+              <a:t>4/15/2019</a:t>
             </a:fld>
             <a:endParaRPr lang="en-US"/>
           </a:p>
@@ -2318,7 +2318,7 @@
           <a:p>
             <a:fld id="{78C97017-6FC3-485B-9764-EAC9E56C1D49}" type="datetimeFigureOut">
               <a:rPr lang="en-US" smtClean="0"/>
-              <a:t>4/14/2019</a:t>
+              <a:t>4/15/2019</a:t>
             </a:fld>
             <a:endParaRPr lang="en-US"/>
           </a:p>
@@ -2413,7 +2413,7 @@
           <a:p>
             <a:fld id="{78C97017-6FC3-485B-9764-EAC9E56C1D49}" type="datetimeFigureOut">
               <a:rPr lang="en-US" smtClean="0"/>
-              <a:t>4/14/2019</a:t>
+              <a:t>4/15/2019</a:t>
             </a:fld>
             <a:endParaRPr lang="en-US"/>
           </a:p>
@@ -2688,7 +2688,7 @@
           <a:p>
             <a:fld id="{78C97017-6FC3-485B-9764-EAC9E56C1D49}" type="datetimeFigureOut">
               <a:rPr lang="en-US" smtClean="0"/>
-              <a:t>4/14/2019</a:t>
+              <a:t>4/15/2019</a:t>
             </a:fld>
             <a:endParaRPr lang="en-US"/>
           </a:p>
@@ -2940,7 +2940,7 @@
           <a:p>
             <a:fld id="{78C97017-6FC3-485B-9764-EAC9E56C1D49}" type="datetimeFigureOut">
               <a:rPr lang="en-US" smtClean="0"/>
-              <a:t>4/14/2019</a:t>
+              <a:t>4/15/2019</a:t>
             </a:fld>
             <a:endParaRPr lang="en-US"/>
           </a:p>
@@ -3151,7 +3151,7 @@
           <a:p>
             <a:fld id="{78C97017-6FC3-485B-9764-EAC9E56C1D49}" type="datetimeFigureOut">
               <a:rPr lang="en-US" smtClean="0"/>
-              <a:t>4/14/2019</a:t>
+              <a:t>4/15/2019</a:t>
             </a:fld>
             <a:endParaRPr lang="en-US"/>
           </a:p>
@@ -5606,6 +5606,55 @@
           </a:p>
         </p:txBody>
       </p:sp>
+      <p:cxnSp>
+        <p:nvCxnSpPr>
+          <p:cNvPr id="45" name="Straight Arrow Connector 44">
+            <a:extLst>
+              <a:ext uri="{FF2B5EF4-FFF2-40B4-BE49-F238E27FC236}">
+                <a16:creationId xmlns:a16="http://schemas.microsoft.com/office/drawing/2014/main" id="{D338C823-A4C1-437A-895D-50208342A6E5}"/>
+              </a:ext>
+            </a:extLst>
+          </p:cNvPr>
+          <p:cNvCxnSpPr>
+            <a:cxnSpLocks/>
+          </p:cNvCxnSpPr>
+          <p:nvPr/>
+        </p:nvCxnSpPr>
+        <p:spPr>
+          <a:xfrm>
+            <a:off x="3017078" y="5282680"/>
+            <a:ext cx="5076000" cy="0"/>
+          </a:xfrm>
+          <a:prstGeom prst="straightConnector1">
+            <a:avLst/>
+          </a:prstGeom>
+          <a:solidFill>
+            <a:srgbClr val="0E5B5B"/>
+          </a:solidFill>
+          <a:ln w="19050">
+            <a:solidFill>
+              <a:srgbClr val="E46C0A"/>
+            </a:solidFill>
+            <a:prstDash val="sysDash"/>
+            <a:headEnd type="arrow" w="med" len="med"/>
+            <a:tailEnd type="none" w="med" len="med"/>
+          </a:ln>
+        </p:spPr>
+        <p:style>
+          <a:lnRef idx="1">
+            <a:schemeClr val="accent1"/>
+          </a:lnRef>
+          <a:fillRef idx="0">
+            <a:schemeClr val="accent1"/>
+          </a:fillRef>
+          <a:effectRef idx="0">
+            <a:schemeClr val="accent1"/>
+          </a:effectRef>
+          <a:fontRef idx="minor">
+            <a:schemeClr val="tx1"/>
+          </a:fontRef>
+        </p:style>
+      </p:cxnSp>
     </p:spTree>
     <p:extLst>
       <p:ext uri="{BB962C8B-B14F-4D97-AF65-F5344CB8AC3E}">

</xml_diff>